<commit_message>
Mise en place pdf presentations
</commit_message>
<xml_diff>
--- a/Analyse des donnees Bottleneck/RAMAT_Romain_Présentation_022025.pptx
+++ b/Analyse des donnees Bottleneck/RAMAT_Romain_Présentation_022025.pptx
@@ -29,14 +29,14 @@
   <p:notesSz cx="6858000" cy="9144000"/>
   <p:embeddedFontLst>
     <p:embeddedFont>
-      <p:font typeface="Inter" panose="02000503000000020004" pitchFamily="2" charset="0"/>
+      <p:font typeface="Inter" panose="020B0604020202020204" charset="0"/>
       <p:regular r:id="rId19"/>
       <p:bold r:id="rId20"/>
       <p:italic r:id="rId21"/>
       <p:boldItalic r:id="rId22"/>
     </p:embeddedFont>
     <p:embeddedFont>
-      <p:font typeface="Montserrat" pitchFamily="2" charset="77"/>
+      <p:font typeface="Montserrat" panose="00000500000000000000" pitchFamily="2" charset="0"/>
       <p:regular r:id="rId23"/>
       <p:bold r:id="rId24"/>
       <p:italic r:id="rId25"/>
@@ -308,7 +308,7 @@
       </p15:sldGuideLst>
     </p:ext>
     <p:ext uri="http://customooxmlschemas.google.com/">
-      <go:slidesCustomData xmlns="" xmlns:mc="http://schemas.openxmlformats.org/markup-compatibility/2006" xmlns:mv="urn:schemas-microsoft-com:mac:vml" xmlns:c="http://schemas.openxmlformats.org/drawingml/2006/chart" xmlns:dgm="http://schemas.openxmlformats.org/drawingml/2006/diagram" xmlns:o="urn:schemas-microsoft-com:office:office" xmlns:v="urn:schemas-microsoft-com:vml" xmlns:pvml="urn:schemas-microsoft-com:office:powerpoint" xmlns:com="http://schemas.openxmlformats.org/drawingml/2006/compatibility" xmlns:p14="http://schemas.microsoft.com/office/powerpoint/2010/main" xmlns:p15="http://schemas.microsoft.com/office/powerpoint/2012/main" xmlns:ahyp="http://schemas.microsoft.com/office/drawing/2018/hyperlinkcolor" xmlns:go="http://customooxmlschemas.google.com/" r:id="rId30" roundtripDataSignature="AMtx7miohyEog1akfKJRRdWquyApPmpApA=="/>
+      <go:slidesCustomData xmlns:go="http://customooxmlschemas.google.com/" xmlns:ahyp="http://schemas.microsoft.com/office/drawing/2018/hyperlinkcolor" xmlns:p15="http://schemas.microsoft.com/office/powerpoint/2012/main" xmlns:p14="http://schemas.microsoft.com/office/powerpoint/2010/main" xmlns:com="http://schemas.openxmlformats.org/drawingml/2006/compatibility" xmlns:pvml="urn:schemas-microsoft-com:office:powerpoint" xmlns:v="urn:schemas-microsoft-com:vml" xmlns:o="urn:schemas-microsoft-com:office:office" xmlns:dgm="http://schemas.openxmlformats.org/drawingml/2006/diagram" xmlns:c="http://schemas.openxmlformats.org/drawingml/2006/chart" xmlns:mv="urn:schemas-microsoft-com:mac:vml" xmlns:mc="http://schemas.openxmlformats.org/markup-compatibility/2006" xmlns="" r:id="rId30" roundtripDataSignature="AMtx7miohyEog1akfKJRRdWquyApPmpApA=="/>
     </p:ext>
   </p:extLst>
 </p:presentation>
@@ -13558,7 +13558,7 @@
                 <a:sym typeface="Montserrat"/>
                 <a:extLst>
                   <a:ext uri="http://customooxmlschemas.google.com/">
-                    <go:slidesCustomData xmlns="" xmlns:mc="http://schemas.openxmlformats.org/markup-compatibility/2006" xmlns:mv="urn:schemas-microsoft-com:mac:vml" xmlns:c="http://schemas.openxmlformats.org/drawingml/2006/chart" xmlns:dgm="http://schemas.openxmlformats.org/drawingml/2006/diagram" xmlns:o="urn:schemas-microsoft-com:office:office" xmlns:v="urn:schemas-microsoft-com:vml" xmlns:pvml="urn:schemas-microsoft-com:office:powerpoint" xmlns:com="http://schemas.openxmlformats.org/drawingml/2006/compatibility" xmlns:p14="http://schemas.microsoft.com/office/powerpoint/2010/main" xmlns:p15="http://schemas.microsoft.com/office/powerpoint/2012/main" xmlns:ahyp="http://schemas.microsoft.com/office/drawing/2018/hyperlinkcolor" xmlns:go="http://customooxmlschemas.google.com/" textRoundtripDataId="0"/>
+                    <go:slidesCustomData xmlns:go="http://customooxmlschemas.google.com/" xmlns:ahyp="http://schemas.microsoft.com/office/drawing/2018/hyperlinkcolor" xmlns:p15="http://schemas.microsoft.com/office/powerpoint/2012/main" xmlns:p14="http://schemas.microsoft.com/office/powerpoint/2010/main" xmlns:com="http://schemas.openxmlformats.org/drawingml/2006/compatibility" xmlns:pvml="urn:schemas-microsoft-com:office:powerpoint" xmlns:v="urn:schemas-microsoft-com:vml" xmlns:o="urn:schemas-microsoft-com:office:office" xmlns:dgm="http://schemas.openxmlformats.org/drawingml/2006/diagram" xmlns:c="http://schemas.openxmlformats.org/drawingml/2006/chart" xmlns:mv="urn:schemas-microsoft-com:mac:vml" xmlns:mc="http://schemas.openxmlformats.org/markup-compatibility/2006" xmlns="" textRoundtripDataId="0"/>
                   </a:ext>
                 </a:extLst>
               </a:rPr>
@@ -13575,7 +13575,7 @@
                 <a:sym typeface="Montserrat"/>
                 <a:extLst>
                   <a:ext uri="http://customooxmlschemas.google.com/">
-                    <go:slidesCustomData xmlns="" xmlns:mc="http://schemas.openxmlformats.org/markup-compatibility/2006" xmlns:mv="urn:schemas-microsoft-com:mac:vml" xmlns:c="http://schemas.openxmlformats.org/drawingml/2006/chart" xmlns:dgm="http://schemas.openxmlformats.org/drawingml/2006/diagram" xmlns:o="urn:schemas-microsoft-com:office:office" xmlns:v="urn:schemas-microsoft-com:vml" xmlns:pvml="urn:schemas-microsoft-com:office:powerpoint" xmlns:com="http://schemas.openxmlformats.org/drawingml/2006/compatibility" xmlns:p14="http://schemas.microsoft.com/office/powerpoint/2010/main" xmlns:p15="http://schemas.microsoft.com/office/powerpoint/2012/main" xmlns:ahyp="http://schemas.microsoft.com/office/drawing/2018/hyperlinkcolor" xmlns:go="http://customooxmlschemas.google.com/" textRoundtripDataId="1"/>
+                    <go:slidesCustomData xmlns:go="http://customooxmlschemas.google.com/" xmlns:ahyp="http://schemas.microsoft.com/office/drawing/2018/hyperlinkcolor" xmlns:p15="http://schemas.microsoft.com/office/powerpoint/2012/main" xmlns:p14="http://schemas.microsoft.com/office/powerpoint/2010/main" xmlns:com="http://schemas.openxmlformats.org/drawingml/2006/compatibility" xmlns:pvml="urn:schemas-microsoft-com:office:powerpoint" xmlns:v="urn:schemas-microsoft-com:vml" xmlns:o="urn:schemas-microsoft-com:office:office" xmlns:dgm="http://schemas.openxmlformats.org/drawingml/2006/diagram" xmlns:c="http://schemas.openxmlformats.org/drawingml/2006/chart" xmlns:mv="urn:schemas-microsoft-com:mac:vml" xmlns:mc="http://schemas.openxmlformats.org/markup-compatibility/2006" xmlns="" textRoundtripDataId="1"/>
                   </a:ext>
                 </a:extLst>
               </a:rPr>
@@ -13592,7 +13592,7 @@
                 <a:sym typeface="Montserrat"/>
                 <a:extLst>
                   <a:ext uri="http://customooxmlschemas.google.com/">
-                    <go:slidesCustomData xmlns="" xmlns:mc="http://schemas.openxmlformats.org/markup-compatibility/2006" xmlns:mv="urn:schemas-microsoft-com:mac:vml" xmlns:c="http://schemas.openxmlformats.org/drawingml/2006/chart" xmlns:dgm="http://schemas.openxmlformats.org/drawingml/2006/diagram" xmlns:o="urn:schemas-microsoft-com:office:office" xmlns:v="urn:schemas-microsoft-com:vml" xmlns:pvml="urn:schemas-microsoft-com:office:powerpoint" xmlns:com="http://schemas.openxmlformats.org/drawingml/2006/compatibility" xmlns:p14="http://schemas.microsoft.com/office/powerpoint/2010/main" xmlns:p15="http://schemas.microsoft.com/office/powerpoint/2012/main" xmlns:ahyp="http://schemas.microsoft.com/office/drawing/2018/hyperlinkcolor" xmlns:go="http://customooxmlschemas.google.com/" textRoundtripDataId="2"/>
+                    <go:slidesCustomData xmlns:go="http://customooxmlschemas.google.com/" xmlns:ahyp="http://schemas.microsoft.com/office/drawing/2018/hyperlinkcolor" xmlns:p15="http://schemas.microsoft.com/office/powerpoint/2012/main" xmlns:p14="http://schemas.microsoft.com/office/powerpoint/2010/main" xmlns:com="http://schemas.openxmlformats.org/drawingml/2006/compatibility" xmlns:pvml="urn:schemas-microsoft-com:office:powerpoint" xmlns:v="urn:schemas-microsoft-com:vml" xmlns:o="urn:schemas-microsoft-com:office:office" xmlns:dgm="http://schemas.openxmlformats.org/drawingml/2006/diagram" xmlns:c="http://schemas.openxmlformats.org/drawingml/2006/chart" xmlns:mv="urn:schemas-microsoft-com:mac:vml" xmlns:mc="http://schemas.openxmlformats.org/markup-compatibility/2006" xmlns="" textRoundtripDataId="2"/>
                   </a:ext>
                 </a:extLst>
               </a:rPr>

</xml_diff>